<commit_message>
Added the draw contact function.
</commit_message>
<xml_diff>
--- a/DesignDoc/DesignDoc.pptx
+++ b/DesignDoc/DesignDoc.pptx
@@ -5,10 +5,11 @@
     <p:sldMasterId id="2147483648" r:id="rId1"/>
   </p:sldMasterIdLst>
   <p:notesMasterIdLst>
-    <p:notesMasterId r:id="rId3"/>
+    <p:notesMasterId r:id="rId4"/>
   </p:notesMasterIdLst>
   <p:sldIdLst>
     <p:sldId id="256" r:id="rId2"/>
+    <p:sldId id="257" r:id="rId3"/>
   </p:sldIdLst>
   <p:sldSz cx="12192000" cy="6858000"/>
   <p:notesSz cx="6858000" cy="9144000"/>
@@ -197,7 +198,7 @@
           <a:p>
             <a:fld id="{88EF8B24-3732-4A0C-9ED5-160AE095BDE2}" type="datetimeFigureOut">
               <a:rPr lang="en-SG" smtClean="0"/>
-              <a:t>18/5/2022</a:t>
+              <a:t>14/7/2022</a:t>
             </a:fld>
             <a:endParaRPr lang="en-SG"/>
           </a:p>
@@ -698,7 +699,7 @@
           <a:p>
             <a:fld id="{C0AC609E-2349-4C9A-B7C5-C4A410DB060E}" type="datetimeFigureOut">
               <a:rPr lang="en-SG" smtClean="0"/>
-              <a:t>18/5/2022</a:t>
+              <a:t>14/7/2022</a:t>
             </a:fld>
             <a:endParaRPr lang="en-SG"/>
           </a:p>
@@ -898,7 +899,7 @@
           <a:p>
             <a:fld id="{C0AC609E-2349-4C9A-B7C5-C4A410DB060E}" type="datetimeFigureOut">
               <a:rPr lang="en-SG" smtClean="0"/>
-              <a:t>18/5/2022</a:t>
+              <a:t>14/7/2022</a:t>
             </a:fld>
             <a:endParaRPr lang="en-SG"/>
           </a:p>
@@ -1108,7 +1109,7 @@
           <a:p>
             <a:fld id="{C0AC609E-2349-4C9A-B7C5-C4A410DB060E}" type="datetimeFigureOut">
               <a:rPr lang="en-SG" smtClean="0"/>
-              <a:t>18/5/2022</a:t>
+              <a:t>14/7/2022</a:t>
             </a:fld>
             <a:endParaRPr lang="en-SG"/>
           </a:p>
@@ -1308,7 +1309,7 @@
           <a:p>
             <a:fld id="{C0AC609E-2349-4C9A-B7C5-C4A410DB060E}" type="datetimeFigureOut">
               <a:rPr lang="en-SG" smtClean="0"/>
-              <a:t>18/5/2022</a:t>
+              <a:t>14/7/2022</a:t>
             </a:fld>
             <a:endParaRPr lang="en-SG"/>
           </a:p>
@@ -1584,7 +1585,7 @@
           <a:p>
             <a:fld id="{C0AC609E-2349-4C9A-B7C5-C4A410DB060E}" type="datetimeFigureOut">
               <a:rPr lang="en-SG" smtClean="0"/>
-              <a:t>18/5/2022</a:t>
+              <a:t>14/7/2022</a:t>
             </a:fld>
             <a:endParaRPr lang="en-SG"/>
           </a:p>
@@ -1852,7 +1853,7 @@
           <a:p>
             <a:fld id="{C0AC609E-2349-4C9A-B7C5-C4A410DB060E}" type="datetimeFigureOut">
               <a:rPr lang="en-SG" smtClean="0"/>
-              <a:t>18/5/2022</a:t>
+              <a:t>14/7/2022</a:t>
             </a:fld>
             <a:endParaRPr lang="en-SG"/>
           </a:p>
@@ -2267,7 +2268,7 @@
           <a:p>
             <a:fld id="{C0AC609E-2349-4C9A-B7C5-C4A410DB060E}" type="datetimeFigureOut">
               <a:rPr lang="en-SG" smtClean="0"/>
-              <a:t>18/5/2022</a:t>
+              <a:t>14/7/2022</a:t>
             </a:fld>
             <a:endParaRPr lang="en-SG"/>
           </a:p>
@@ -2409,7 +2410,7 @@
           <a:p>
             <a:fld id="{C0AC609E-2349-4C9A-B7C5-C4A410DB060E}" type="datetimeFigureOut">
               <a:rPr lang="en-SG" smtClean="0"/>
-              <a:t>18/5/2022</a:t>
+              <a:t>14/7/2022</a:t>
             </a:fld>
             <a:endParaRPr lang="en-SG"/>
           </a:p>
@@ -2522,7 +2523,7 @@
           <a:p>
             <a:fld id="{C0AC609E-2349-4C9A-B7C5-C4A410DB060E}" type="datetimeFigureOut">
               <a:rPr lang="en-SG" smtClean="0"/>
-              <a:t>18/5/2022</a:t>
+              <a:t>14/7/2022</a:t>
             </a:fld>
             <a:endParaRPr lang="en-SG"/>
           </a:p>
@@ -2835,7 +2836,7 @@
           <a:p>
             <a:fld id="{C0AC609E-2349-4C9A-B7C5-C4A410DB060E}" type="datetimeFigureOut">
               <a:rPr lang="en-SG" smtClean="0"/>
-              <a:t>18/5/2022</a:t>
+              <a:t>14/7/2022</a:t>
             </a:fld>
             <a:endParaRPr lang="en-SG"/>
           </a:p>
@@ -3124,7 +3125,7 @@
           <a:p>
             <a:fld id="{C0AC609E-2349-4C9A-B7C5-C4A410DB060E}" type="datetimeFigureOut">
               <a:rPr lang="en-SG" smtClean="0"/>
-              <a:t>18/5/2022</a:t>
+              <a:t>14/7/2022</a:t>
             </a:fld>
             <a:endParaRPr lang="en-SG"/>
           </a:p>
@@ -3367,7 +3368,7 @@
           <a:p>
             <a:fld id="{C0AC609E-2349-4C9A-B7C5-C4A410DB060E}" type="datetimeFigureOut">
               <a:rPr lang="en-SG" smtClean="0"/>
-              <a:t>18/5/2022</a:t>
+              <a:t>14/7/2022</a:t>
             </a:fld>
             <a:endParaRPr lang="en-SG"/>
           </a:p>
@@ -4933,6 +4934,148 @@
     <p:extLst>
       <p:ext uri="{BB962C8B-B14F-4D97-AF65-F5344CB8AC3E}">
         <p14:creationId xmlns:p14="http://schemas.microsoft.com/office/powerpoint/2010/main" val="157686762"/>
+      </p:ext>
+    </p:extLst>
+  </p:cSld>
+  <p:clrMapOvr>
+    <a:masterClrMapping/>
+  </p:clrMapOvr>
+</p:sld>
+</file>
+
+<file path=ppt/slides/slide2.xml><?xml version="1.0" encoding="utf-8"?>
+<p:sld xmlns:a="http://schemas.openxmlformats.org/drawingml/2006/main" xmlns:r="http://schemas.openxmlformats.org/officeDocument/2006/relationships" xmlns:p="http://schemas.openxmlformats.org/presentationml/2006/main">
+  <p:cSld>
+    <p:spTree>
+      <p:nvGrpSpPr>
+        <p:cNvPr id="1" name=""/>
+        <p:cNvGrpSpPr/>
+        <p:nvPr/>
+      </p:nvGrpSpPr>
+      <p:grpSpPr>
+        <a:xfrm>
+          <a:off x="0" y="0"/>
+          <a:ext cx="0" cy="0"/>
+          <a:chOff x="0" y="0"/>
+          <a:chExt cx="0" cy="0"/>
+        </a:xfrm>
+      </p:grpSpPr>
+      <p:sp>
+        <p:nvSpPr>
+          <p:cNvPr id="2" name="Title 1">
+            <a:extLst>
+              <a:ext uri="{FF2B5EF4-FFF2-40B4-BE49-F238E27FC236}">
+                <a16:creationId xmlns:a16="http://schemas.microsoft.com/office/drawing/2014/main" id="{CA5CB771-D4FA-F7DD-0C87-D1E9500CA7A5}"/>
+              </a:ext>
+            </a:extLst>
+          </p:cNvPr>
+          <p:cNvSpPr>
+            <a:spLocks noGrp="1"/>
+          </p:cNvSpPr>
+          <p:nvPr>
+            <p:ph type="title"/>
+          </p:nvPr>
+        </p:nvSpPr>
+        <p:spPr/>
+        <p:txBody>
+          <a:bodyPr/>
+          <a:lstStyle/>
+          <a:p>
+            <a:endParaRPr lang="en-SG"/>
+          </a:p>
+        </p:txBody>
+      </p:sp>
+      <p:cxnSp>
+        <p:nvCxnSpPr>
+          <p:cNvPr id="5" name="Straight Connector 4">
+            <a:extLst>
+              <a:ext uri="{FF2B5EF4-FFF2-40B4-BE49-F238E27FC236}">
+                <a16:creationId xmlns:a16="http://schemas.microsoft.com/office/drawing/2014/main" id="{2C628ADB-869D-F336-5256-ED5DE74316C7}"/>
+              </a:ext>
+            </a:extLst>
+          </p:cNvPr>
+          <p:cNvCxnSpPr>
+            <a:cxnSpLocks/>
+          </p:cNvCxnSpPr>
+          <p:nvPr/>
+        </p:nvCxnSpPr>
+        <p:spPr>
+          <a:xfrm>
+            <a:off x="3858768" y="3410712"/>
+            <a:ext cx="950976" cy="9144"/>
+          </a:xfrm>
+          <a:prstGeom prst="line">
+            <a:avLst/>
+          </a:prstGeom>
+          <a:ln w="57150">
+            <a:solidFill>
+              <a:schemeClr val="tx1">
+                <a:lumMod val="50000"/>
+                <a:lumOff val="50000"/>
+              </a:schemeClr>
+            </a:solidFill>
+          </a:ln>
+        </p:spPr>
+        <p:style>
+          <a:lnRef idx="1">
+            <a:schemeClr val="dk1"/>
+          </a:lnRef>
+          <a:fillRef idx="0">
+            <a:schemeClr val="dk1"/>
+          </a:fillRef>
+          <a:effectRef idx="0">
+            <a:schemeClr val="dk1"/>
+          </a:effectRef>
+          <a:fontRef idx="minor">
+            <a:schemeClr val="tx1"/>
+          </a:fontRef>
+        </p:style>
+      </p:cxnSp>
+      <p:sp>
+        <p:nvSpPr>
+          <p:cNvPr id="6" name="TextBox 5">
+            <a:extLst>
+              <a:ext uri="{FF2B5EF4-FFF2-40B4-BE49-F238E27FC236}">
+                <a16:creationId xmlns:a16="http://schemas.microsoft.com/office/drawing/2014/main" id="{CD559CA2-9F68-A94D-AEC4-F32FDD80DF44}"/>
+              </a:ext>
+            </a:extLst>
+          </p:cNvPr>
+          <p:cNvSpPr txBox="1"/>
+          <p:nvPr/>
+        </p:nvSpPr>
+        <p:spPr>
+          <a:xfrm>
+            <a:off x="3858768" y="2858500"/>
+            <a:ext cx="950976" cy="369332"/>
+          </a:xfrm>
+          <a:prstGeom prst="rect">
+            <a:avLst/>
+          </a:prstGeom>
+          <a:noFill/>
+          <a:ln>
+            <a:solidFill>
+              <a:schemeClr val="tx1"/>
+            </a:solidFill>
+            <a:prstDash val="dash"/>
+          </a:ln>
+        </p:spPr>
+        <p:txBody>
+          <a:bodyPr wrap="square" rtlCol="0">
+            <a:spAutoFit/>
+          </a:bodyPr>
+          <a:lstStyle/>
+          <a:p>
+            <a:r>
+              <a:rPr lang="en-SG" dirty="0"/>
+              <a:t>Line</a:t>
+            </a:r>
+          </a:p>
+        </p:txBody>
+      </p:sp>
+    </p:spTree>
+    <p:extLst>
+      <p:ext uri="{BB962C8B-B14F-4D97-AF65-F5344CB8AC3E}">
+        <p14:creationId xmlns:p14="http://schemas.microsoft.com/office/powerpoint/2010/main" val="1092050082"/>
       </p:ext>
     </p:extLst>
   </p:cSld>

</xml_diff>

<commit_message>
Added the contact selection line.
</commit_message>
<xml_diff>
--- a/DesignDoc/DesignDoc.pptx
+++ b/DesignDoc/DesignDoc.pptx
@@ -198,7 +198,7 @@
           <a:p>
             <a:fld id="{88EF8B24-3732-4A0C-9ED5-160AE095BDE2}" type="datetimeFigureOut">
               <a:rPr lang="en-SG" smtClean="0"/>
-              <a:t>14/7/2022</a:t>
+              <a:t>15/7/2022</a:t>
             </a:fld>
             <a:endParaRPr lang="en-SG"/>
           </a:p>
@@ -699,7 +699,7 @@
           <a:p>
             <a:fld id="{C0AC609E-2349-4C9A-B7C5-C4A410DB060E}" type="datetimeFigureOut">
               <a:rPr lang="en-SG" smtClean="0"/>
-              <a:t>14/7/2022</a:t>
+              <a:t>15/7/2022</a:t>
             </a:fld>
             <a:endParaRPr lang="en-SG"/>
           </a:p>
@@ -899,7 +899,7 @@
           <a:p>
             <a:fld id="{C0AC609E-2349-4C9A-B7C5-C4A410DB060E}" type="datetimeFigureOut">
               <a:rPr lang="en-SG" smtClean="0"/>
-              <a:t>14/7/2022</a:t>
+              <a:t>15/7/2022</a:t>
             </a:fld>
             <a:endParaRPr lang="en-SG"/>
           </a:p>
@@ -1109,7 +1109,7 @@
           <a:p>
             <a:fld id="{C0AC609E-2349-4C9A-B7C5-C4A410DB060E}" type="datetimeFigureOut">
               <a:rPr lang="en-SG" smtClean="0"/>
-              <a:t>14/7/2022</a:t>
+              <a:t>15/7/2022</a:t>
             </a:fld>
             <a:endParaRPr lang="en-SG"/>
           </a:p>
@@ -1309,7 +1309,7 @@
           <a:p>
             <a:fld id="{C0AC609E-2349-4C9A-B7C5-C4A410DB060E}" type="datetimeFigureOut">
               <a:rPr lang="en-SG" smtClean="0"/>
-              <a:t>14/7/2022</a:t>
+              <a:t>15/7/2022</a:t>
             </a:fld>
             <a:endParaRPr lang="en-SG"/>
           </a:p>
@@ -1585,7 +1585,7 @@
           <a:p>
             <a:fld id="{C0AC609E-2349-4C9A-B7C5-C4A410DB060E}" type="datetimeFigureOut">
               <a:rPr lang="en-SG" smtClean="0"/>
-              <a:t>14/7/2022</a:t>
+              <a:t>15/7/2022</a:t>
             </a:fld>
             <a:endParaRPr lang="en-SG"/>
           </a:p>
@@ -1853,7 +1853,7 @@
           <a:p>
             <a:fld id="{C0AC609E-2349-4C9A-B7C5-C4A410DB060E}" type="datetimeFigureOut">
               <a:rPr lang="en-SG" smtClean="0"/>
-              <a:t>14/7/2022</a:t>
+              <a:t>15/7/2022</a:t>
             </a:fld>
             <a:endParaRPr lang="en-SG"/>
           </a:p>
@@ -2268,7 +2268,7 @@
           <a:p>
             <a:fld id="{C0AC609E-2349-4C9A-B7C5-C4A410DB060E}" type="datetimeFigureOut">
               <a:rPr lang="en-SG" smtClean="0"/>
-              <a:t>14/7/2022</a:t>
+              <a:t>15/7/2022</a:t>
             </a:fld>
             <a:endParaRPr lang="en-SG"/>
           </a:p>
@@ -2410,7 +2410,7 @@
           <a:p>
             <a:fld id="{C0AC609E-2349-4C9A-B7C5-C4A410DB060E}" type="datetimeFigureOut">
               <a:rPr lang="en-SG" smtClean="0"/>
-              <a:t>14/7/2022</a:t>
+              <a:t>15/7/2022</a:t>
             </a:fld>
             <a:endParaRPr lang="en-SG"/>
           </a:p>
@@ -2523,7 +2523,7 @@
           <a:p>
             <a:fld id="{C0AC609E-2349-4C9A-B7C5-C4A410DB060E}" type="datetimeFigureOut">
               <a:rPr lang="en-SG" smtClean="0"/>
-              <a:t>14/7/2022</a:t>
+              <a:t>15/7/2022</a:t>
             </a:fld>
             <a:endParaRPr lang="en-SG"/>
           </a:p>
@@ -2836,7 +2836,7 @@
           <a:p>
             <a:fld id="{C0AC609E-2349-4C9A-B7C5-C4A410DB060E}" type="datetimeFigureOut">
               <a:rPr lang="en-SG" smtClean="0"/>
-              <a:t>14/7/2022</a:t>
+              <a:t>15/7/2022</a:t>
             </a:fld>
             <a:endParaRPr lang="en-SG"/>
           </a:p>
@@ -3125,7 +3125,7 @@
           <a:p>
             <a:fld id="{C0AC609E-2349-4C9A-B7C5-C4A410DB060E}" type="datetimeFigureOut">
               <a:rPr lang="en-SG" smtClean="0"/>
-              <a:t>14/7/2022</a:t>
+              <a:t>15/7/2022</a:t>
             </a:fld>
             <a:endParaRPr lang="en-SG"/>
           </a:p>
@@ -3368,7 +3368,7 @@
           <a:p>
             <a:fld id="{C0AC609E-2349-4C9A-B7C5-C4A410DB060E}" type="datetimeFigureOut">
               <a:rPr lang="en-SG" smtClean="0"/>
-              <a:t>14/7/2022</a:t>
+              <a:t>15/7/2022</a:t>
             </a:fld>
             <a:endParaRPr lang="en-SG"/>
           </a:p>
@@ -5069,6 +5069,50 @@
               <a:rPr lang="en-SG" dirty="0"/>
               <a:t>Line</a:t>
             </a:r>
+          </a:p>
+        </p:txBody>
+      </p:sp>
+      <p:sp>
+        <p:nvSpPr>
+          <p:cNvPr id="7" name="TextBox 6">
+            <a:extLst>
+              <a:ext uri="{FF2B5EF4-FFF2-40B4-BE49-F238E27FC236}">
+                <a16:creationId xmlns:a16="http://schemas.microsoft.com/office/drawing/2014/main" id="{14054BFD-D670-8A93-E193-313391318342}"/>
+              </a:ext>
+            </a:extLst>
+          </p:cNvPr>
+          <p:cNvSpPr txBox="1"/>
+          <p:nvPr/>
+        </p:nvSpPr>
+        <p:spPr>
+          <a:xfrm>
+            <a:off x="5178552" y="2858500"/>
+            <a:ext cx="1036320" cy="646331"/>
+          </a:xfrm>
+          <a:prstGeom prst="rect">
+            <a:avLst/>
+          </a:prstGeom>
+          <a:noFill/>
+          <a:ln w="19050">
+            <a:solidFill>
+              <a:schemeClr val="tx1"/>
+            </a:solidFill>
+            <a:prstDash val="sysDash"/>
+          </a:ln>
+        </p:spPr>
+        <p:txBody>
+          <a:bodyPr wrap="square" rtlCol="0">
+            <a:spAutoFit/>
+          </a:bodyPr>
+          <a:lstStyle/>
+          <a:p>
+            <a:r>
+              <a:rPr lang="en-US" dirty="0"/>
+              <a:t>clear</a:t>
+            </a:r>
+          </a:p>
+          <a:p>
+            <a:endParaRPr lang="en-SG" dirty="0"/>
           </a:p>
         </p:txBody>
       </p:sp>

</xml_diff>